<commit_message>
Added key motivators from WS Noble
</commit_message>
<xml_diff>
--- a/archer/PullTogether.pptx
+++ b/archer/PullTogether.pptx
@@ -7,14 +7,15 @@
     <p:sldMasterId id="2147483705" r:id="rId3"/>
   </p:sldMasterIdLst>
   <p:notesMasterIdLst>
-    <p:notesMasterId r:id="rId6"/>
+    <p:notesMasterId r:id="rId7"/>
   </p:notesMasterIdLst>
   <p:handoutMasterIdLst>
-    <p:handoutMasterId r:id="rId7"/>
+    <p:handoutMasterId r:id="rId8"/>
   </p:handoutMasterIdLst>
   <p:sldIdLst>
     <p:sldId id="334" r:id="rId4"/>
     <p:sldId id="348" r:id="rId5"/>
+    <p:sldId id="349" r:id="rId6"/>
   </p:sldIdLst>
   <p:sldSz cx="9144000" cy="6858000" type="screen4x3"/>
   <p:notesSz cx="6985000" cy="9283700"/>
@@ -1098,17 +1099,8 @@
               <a:rPr lang="en-GB" altLang="en-US" dirty="0" smtClean="0">
                 <a:latin typeface="Times New Roman" pitchFamily="18" charset="0"/>
               </a:rPr>
-              <a:t>“Scientists spend an increasing amount of time building and using software. However, most scientists are never taught how to do this efficiently. As a result, many are unaware of tools and practices that would allow them to write more reliable and maintainable code with less effort. We describe a set of best practices for scientific software development that have solid foundations in research and experience, and that improve scientists' productivity and the reliability of their </a:t>
-            </a:r>
-            <a:r>
-              <a:rPr lang="en-GB" altLang="en-US" smtClean="0">
-                <a:latin typeface="Times New Roman" pitchFamily="18" charset="0"/>
-              </a:rPr>
-              <a:t>software.”</a:t>
-            </a:r>
-            <a:endParaRPr lang="en-GB" altLang="en-US" dirty="0" smtClean="0">
-              <a:latin typeface="Times New Roman" pitchFamily="18" charset="0"/>
-            </a:endParaRPr>
+              <a:t>“Scientists spend an increasing amount of time building and using software. However, most scientists are never taught how to do this efficiently. As a result, many are unaware of tools and practices that would allow them to write more reliable and maintainable code with less effort. We describe a set of best practices for scientific software development that have solid foundations in research and experience, and that improve scientists' productivity and the reliability of their software.”</a:t>
+            </a:r>
           </a:p>
           <a:p>
             <a:r>
@@ -1462,6 +1454,101 @@
           <a:bodyPr/>
           <a:lstStyle/>
           <a:p>
+            <a:r>
+              <a:rPr lang="en-GB" altLang="en-US" dirty="0" smtClean="0">
+                <a:latin typeface="Times New Roman" pitchFamily="18" charset="0"/>
+              </a:rPr>
+              <a:t>Track how results were produced. This includes: data files, parameters, command-line parameters, configuration files, URLs of</a:t>
+            </a:r>
+            <a:r>
+              <a:rPr lang="en-GB" altLang="en-US" baseline="0" dirty="0" smtClean="0">
+                <a:latin typeface="Times New Roman" pitchFamily="18" charset="0"/>
+              </a:rPr>
+              <a:t> online data sources, software versions etc.</a:t>
+            </a:r>
+            <a:endParaRPr lang="en-GB" altLang="en-US" dirty="0" smtClean="0">
+              <a:latin typeface="Times New Roman" pitchFamily="18" charset="0"/>
+            </a:endParaRPr>
+          </a:p>
+          <a:p>
+            <a:r>
+              <a:rPr lang="en-GB" altLang="en-US" dirty="0" smtClean="0">
+                <a:latin typeface="Times New Roman" pitchFamily="18" charset="0"/>
+              </a:rPr>
+              <a:t>Automate</a:t>
+            </a:r>
+            <a:r>
+              <a:rPr lang="en-GB" altLang="en-US" baseline="0" dirty="0" smtClean="0">
+                <a:latin typeface="Times New Roman" pitchFamily="18" charset="0"/>
+              </a:rPr>
+              <a:t> manual data manipulation steps – shell scripts, Python scripts, pipelines e.g. </a:t>
+            </a:r>
+            <a:r>
+              <a:rPr lang="en-GB" altLang="en-US" dirty="0" smtClean="0">
+                <a:latin typeface="Times New Roman" pitchFamily="18" charset="0"/>
+              </a:rPr>
+              <a:t>e.g. </a:t>
+            </a:r>
+            <a:r>
+              <a:rPr lang="en-GB" altLang="en-US" dirty="0" err="1" smtClean="0">
+                <a:latin typeface="Times New Roman" pitchFamily="18" charset="0"/>
+              </a:rPr>
+              <a:t>sed</a:t>
+            </a:r>
+            <a:r>
+              <a:rPr lang="en-GB" altLang="en-US" dirty="0" smtClean="0">
+                <a:latin typeface="Times New Roman" pitchFamily="18" charset="0"/>
+              </a:rPr>
+              <a:t>, </a:t>
+            </a:r>
+            <a:r>
+              <a:rPr lang="en-GB" altLang="en-US" dirty="0" err="1" smtClean="0">
+                <a:latin typeface="Times New Roman" pitchFamily="18" charset="0"/>
+              </a:rPr>
+              <a:t>awk</a:t>
+            </a:r>
+            <a:r>
+              <a:rPr lang="en-GB" altLang="en-US" dirty="0" smtClean="0">
+                <a:latin typeface="Times New Roman" pitchFamily="18" charset="0"/>
+              </a:rPr>
+              <a:t>, </a:t>
+            </a:r>
+            <a:r>
+              <a:rPr lang="en-GB" altLang="en-US" dirty="0" err="1" smtClean="0">
+                <a:latin typeface="Times New Roman" pitchFamily="18" charset="0"/>
+              </a:rPr>
+              <a:t>grep</a:t>
+            </a:r>
+            <a:r>
+              <a:rPr lang="en-GB" altLang="en-US" dirty="0" smtClean="0">
+                <a:latin typeface="Times New Roman" pitchFamily="18" charset="0"/>
+              </a:rPr>
+              <a:t>, head, tail, sort,</a:t>
+            </a:r>
+          </a:p>
+          <a:p>
+            <a:r>
+              <a:rPr lang="en-GB" altLang="en-US" dirty="0" smtClean="0">
+                <a:latin typeface="Times New Roman" pitchFamily="18" charset="0"/>
+              </a:rPr>
+              <a:t>If</a:t>
+            </a:r>
+            <a:r>
+              <a:rPr lang="en-GB" altLang="en-US" baseline="0" dirty="0" smtClean="0">
+                <a:latin typeface="Times New Roman" pitchFamily="18" charset="0"/>
+              </a:rPr>
+              <a:t> a file format supports meta-data then use it to record – who, when, what version of software produced it etc.</a:t>
+            </a:r>
+          </a:p>
+          <a:p>
+            <a:r>
+              <a:rPr lang="en-GB" altLang="en-US" baseline="0" dirty="0" smtClean="0">
+                <a:latin typeface="Times New Roman" pitchFamily="18" charset="0"/>
+              </a:rPr>
+              <a:t>If you are defining your own file format, then add this meta-data.</a:t>
+            </a:r>
+          </a:p>
+          <a:p>
             <a:endParaRPr lang="en-GB" altLang="en-US" dirty="0" smtClean="0">
               <a:latin typeface="Times New Roman" pitchFamily="18" charset="0"/>
             </a:endParaRPr>
@@ -1496,6 +1583,114 @@
     <p:extLst>
       <p:ext uri="{BB962C8B-B14F-4D97-AF65-F5344CB8AC3E}">
         <p14:creationId xmlns:p14="http://schemas.microsoft.com/office/powerpoint/2010/main" val="3378169789"/>
+      </p:ext>
+    </p:extLst>
+  </p:cSld>
+  <p:clrMapOvr>
+    <a:masterClrMapping/>
+  </p:clrMapOvr>
+</p:notes>
+</file>
+
+<file path=ppt/notesSlides/notesSlide3.xml><?xml version="1.0" encoding="utf-8"?>
+<p:notes xmlns:a="http://schemas.openxmlformats.org/drawingml/2006/main" xmlns:r="http://schemas.openxmlformats.org/officeDocument/2006/relationships" xmlns:p="http://schemas.openxmlformats.org/presentationml/2006/main">
+  <p:cSld>
+    <p:spTree>
+      <p:nvGrpSpPr>
+        <p:cNvPr id="1" name=""/>
+        <p:cNvGrpSpPr/>
+        <p:nvPr/>
+      </p:nvGrpSpPr>
+      <p:grpSpPr>
+        <a:xfrm>
+          <a:off x="0" y="0"/>
+          <a:ext cx="0" cy="0"/>
+          <a:chOff x="0" y="0"/>
+          <a:chExt cx="0" cy="0"/>
+        </a:xfrm>
+      </p:grpSpPr>
+      <p:sp>
+        <p:nvSpPr>
+          <p:cNvPr id="2" name="Slide Image Placeholder 1"/>
+          <p:cNvSpPr>
+            <a:spLocks noGrp="1" noRot="1" noChangeAspect="1"/>
+          </p:cNvSpPr>
+          <p:nvPr>
+            <p:ph type="sldImg"/>
+          </p:nvPr>
+        </p:nvSpPr>
+        <p:spPr/>
+      </p:sp>
+      <p:sp>
+        <p:nvSpPr>
+          <p:cNvPr id="3" name="Notes Placeholder 2"/>
+          <p:cNvSpPr>
+            <a:spLocks noGrp="1"/>
+          </p:cNvSpPr>
+          <p:nvPr>
+            <p:ph type="body" idx="1"/>
+          </p:nvPr>
+        </p:nvSpPr>
+        <p:spPr/>
+        <p:txBody>
+          <a:bodyPr/>
+          <a:lstStyle/>
+          <a:p>
+            <a:pPr marL="0" marR="0" indent="0" algn="l" defTabSz="914400" rtl="0" eaLnBrk="0" fontAlgn="base" latinLnBrk="0" hangingPunct="0">
+              <a:lnSpc>
+                <a:spcPct val="100000"/>
+              </a:lnSpc>
+              <a:spcBef>
+                <a:spcPct val="30000"/>
+              </a:spcBef>
+              <a:spcAft>
+                <a:spcPct val="0"/>
+              </a:spcAft>
+              <a:buClrTx/>
+              <a:buSzTx/>
+              <a:buFontTx/>
+              <a:buNone/>
+              <a:tabLst/>
+              <a:defRPr/>
+            </a:pPr>
+            <a:r>
+              <a:rPr lang="en-GB" dirty="0" smtClean="0"/>
+              <a:t>“A few months from now, you may not remember what you were up to when you created a particular set of files, or you may not remember what conclusions you drew. You will either have to then spend time reconstructing your previous experiments or lose whatever insights you gained from those experiments.”</a:t>
+            </a:r>
+          </a:p>
+          <a:p>
+            <a:endParaRPr lang="en-GB" dirty="0"/>
+          </a:p>
+        </p:txBody>
+      </p:sp>
+      <p:sp>
+        <p:nvSpPr>
+          <p:cNvPr id="4" name="Slide Number Placeholder 3"/>
+          <p:cNvSpPr>
+            <a:spLocks noGrp="1"/>
+          </p:cNvSpPr>
+          <p:nvPr>
+            <p:ph type="sldNum" sz="quarter" idx="10"/>
+          </p:nvPr>
+        </p:nvSpPr>
+        <p:spPr/>
+        <p:txBody>
+          <a:bodyPr/>
+          <a:lstStyle/>
+          <a:p>
+            <a:fld id="{BC4308F6-7504-405D-B1BC-57B75797A76A}" type="slidenum">
+              <a:rPr lang="en-GB" smtClean="0"/>
+              <a:pPr/>
+              <a:t>3</a:t>
+            </a:fld>
+            <a:endParaRPr lang="en-GB"/>
+          </a:p>
+        </p:txBody>
+      </p:sp>
+    </p:spTree>
+    <p:extLst>
+      <p:ext uri="{BB962C8B-B14F-4D97-AF65-F5344CB8AC3E}">
+        <p14:creationId xmlns:p14="http://schemas.microsoft.com/office/powerpoint/2010/main" val="2985979959"/>
       </p:ext>
     </p:extLst>
   </p:cSld>
@@ -2610,7 +2805,7 @@
           <a:p>
             <a:fld id="{173132C3-466D-EB4C-A942-AD4AB1C0C7A2}" type="datetimeFigureOut">
               <a:rPr lang="en-US" smtClean="0"/>
-              <a:t>5/30/2014</a:t>
+              <a:t>6/9/2014</a:t>
             </a:fld>
             <a:endParaRPr lang="en-US"/>
           </a:p>
@@ -5033,7 +5228,7 @@
                 </a:solidFill>
               </a:rPr>
               <a:pPr defTabSz="914400"/>
-              <a:t>5/30/2014</a:t>
+              <a:t>6/9/2014</a:t>
             </a:fld>
             <a:endParaRPr lang="en-US">
               <a:solidFill>
@@ -5300,7 +5495,7 @@
             <a:fld id="{B3AADCBB-3292-4C70-BBC1-B70D83C23A97}" type="datetime1">
               <a:rPr lang="en-GB" smtClean="0"/>
               <a:pPr/>
-              <a:t>30/05/2014</a:t>
+              <a:t>09/06/2014</a:t>
             </a:fld>
             <a:endParaRPr lang="en-GB">
               <a:solidFill>
@@ -8801,12 +8996,8 @@
               <a:buNone/>
             </a:pPr>
             <a:r>
-              <a:rPr lang="en-GB" sz="1100" dirty="0" smtClean="0"/>
-              <a:t>Greg </a:t>
-            </a:r>
-            <a:r>
               <a:rPr lang="en-GB" sz="1100" dirty="0"/>
-              <a:t>Wilson, D. A. </a:t>
+              <a:t>Wilson G, </a:t>
             </a:r>
             <a:r>
               <a:rPr lang="en-GB" sz="1100" dirty="0" err="1"/>
@@ -8814,7 +9005,7 @@
             </a:r>
             <a:r>
               <a:rPr lang="en-GB" sz="1100" dirty="0"/>
-              <a:t>, C. Titus Brown, Neil P. </a:t>
+              <a:t> DA, Brown CT, </a:t>
             </a:r>
             <a:r>
               <a:rPr lang="en-GB" sz="1100" dirty="0" err="1"/>
@@ -8822,16 +9013,51 @@
             </a:r>
             <a:r>
               <a:rPr lang="en-GB" sz="1100" dirty="0"/>
-              <a:t> Hong, Matt Davis, Richard T. Guy, Steven H. D. Haddock, Katy Huff, Ian M. Mitchell, Mark </a:t>
+              <a:t> Hong NP, Davis M, et al. (2014) Best Practices for Scientific Computing. </a:t>
             </a:r>
             <a:r>
               <a:rPr lang="en-GB" sz="1100" dirty="0" err="1"/>
-              <a:t>Plumbley</a:t>
+              <a:t>PLoS</a:t>
             </a:r>
             <a:r>
               <a:rPr lang="en-GB" sz="1100" dirty="0"/>
-              <a:t>, Ben Waugh, Ethan P. White, Paul Wilson, Best Practices for Scientific Computing, 26/09/13, http://arxiv.org/abs/1210.0530</a:t>
-            </a:r>
+              <a:t> </a:t>
+            </a:r>
+            <a:r>
+              <a:rPr lang="en-GB" sz="1100" dirty="0" err="1"/>
+              <a:t>Biol</a:t>
+            </a:r>
+            <a:r>
+              <a:rPr lang="en-GB" sz="1100" dirty="0"/>
+              <a:t> 12(1): e1001745. </a:t>
+            </a:r>
+            <a:r>
+              <a:rPr lang="en-GB" sz="1100" dirty="0" smtClean="0"/>
+              <a:t>doi:10.1371/journal.pbio.1001745. </a:t>
+            </a:r>
+            <a:r>
+              <a:rPr lang="en-GB" sz="1100" dirty="0" smtClean="0">
+                <a:hlinkClick r:id="rId3"/>
+              </a:rPr>
+              <a:t>http</a:t>
+            </a:r>
+            <a:r>
+              <a:rPr lang="en-GB" sz="1100" dirty="0">
+                <a:hlinkClick r:id="rId3"/>
+              </a:rPr>
+              <a:t>://</a:t>
+            </a:r>
+            <a:r>
+              <a:rPr lang="en-GB" sz="1100" dirty="0" smtClean="0">
+                <a:hlinkClick r:id="rId3"/>
+              </a:rPr>
+              <a:t>dx.doi.org/10.1371/journal.pbio.1001745</a:t>
+            </a:r>
+            <a:r>
+              <a:rPr lang="en-GB" sz="1100" dirty="0" smtClean="0"/>
+              <a:t>. </a:t>
+            </a:r>
+            <a:endParaRPr lang="en-GB" sz="1100" dirty="0"/>
           </a:p>
           <a:p>
             <a:endParaRPr lang="en-GB" dirty="0"/>
@@ -9450,16 +9676,32 @@
               <a:buNone/>
             </a:pPr>
             <a:r>
-              <a:rPr lang="en-GB" sz="1100" dirty="0" err="1" smtClean="0"/>
-              <a:t>Geir</a:t>
-            </a:r>
-            <a:r>
-              <a:rPr lang="en-GB" sz="1100" dirty="0" smtClean="0"/>
-              <a:t> </a:t>
-            </a:r>
-            <a:r>
               <a:rPr lang="en-GB" sz="1100" dirty="0" err="1"/>
-              <a:t>Kjetil</a:t>
+              <a:t>Sandve</a:t>
+            </a:r>
+            <a:r>
+              <a:rPr lang="en-GB" sz="1100" dirty="0"/>
+              <a:t> GK, </a:t>
+            </a:r>
+            <a:r>
+              <a:rPr lang="en-GB" sz="1100" dirty="0" err="1"/>
+              <a:t>Nekrutenko</a:t>
+            </a:r>
+            <a:r>
+              <a:rPr lang="en-GB" sz="1100" dirty="0"/>
+              <a:t> A, Taylor J, </a:t>
+            </a:r>
+            <a:r>
+              <a:rPr lang="en-GB" sz="1100" dirty="0" err="1"/>
+              <a:t>Hovig</a:t>
+            </a:r>
+            <a:r>
+              <a:rPr lang="en-GB" sz="1100" dirty="0"/>
+              <a:t> E (2013) Ten Simple Rules for Reproducible Computational Research. </a:t>
+            </a:r>
+            <a:r>
+              <a:rPr lang="en-GB" sz="1100" dirty="0" err="1"/>
+              <a:t>PLoS</a:t>
             </a:r>
             <a:r>
               <a:rPr lang="en-GB" sz="1100" dirty="0"/>
@@ -9467,23 +9709,7 @@
             </a:r>
             <a:r>
               <a:rPr lang="en-GB" sz="1100" dirty="0" err="1"/>
-              <a:t>Sandve</a:t>
-            </a:r>
-            <a:r>
-              <a:rPr lang="en-GB" sz="1100" dirty="0"/>
-              <a:t>, Anton </a:t>
-            </a:r>
-            <a:r>
-              <a:rPr lang="en-GB" sz="1100" dirty="0" err="1"/>
-              <a:t>Nekrutenko</a:t>
-            </a:r>
-            <a:r>
-              <a:rPr lang="en-GB" sz="1100" dirty="0"/>
-              <a:t>, James Taylor, </a:t>
-            </a:r>
-            <a:r>
-              <a:rPr lang="en-GB" sz="1100" dirty="0" err="1"/>
-              <a:t>Eivind</a:t>
+              <a:t>Comput</a:t>
             </a:r>
             <a:r>
               <a:rPr lang="en-GB" sz="1100" dirty="0"/>
@@ -9491,14 +9717,38 @@
             </a:r>
             <a:r>
               <a:rPr lang="en-GB" sz="1100" dirty="0" err="1"/>
-              <a:t>Hovig</a:t>
+              <a:t>Biol</a:t>
             </a:r>
             <a:r>
               <a:rPr lang="en-GB" sz="1100" dirty="0"/>
-              <a:t>. Ten Simple Rules for Reproducible Computational Research. PLOS Computational Biology, 24/10/13, http://dx.doi.org/10.1371/journal.pcbi.1003285</a:t>
-            </a:r>
-          </a:p>
-          <a:p>
+              <a:t> 9(10): e1003285. </a:t>
+            </a:r>
+            <a:r>
+              <a:rPr lang="en-GB" sz="1100" dirty="0" smtClean="0"/>
+              <a:t>doi:10.1371/journal.pcbi.1003285. </a:t>
+            </a:r>
+            <a:r>
+              <a:rPr lang="en-GB" sz="1100" dirty="0" smtClean="0">
+                <a:hlinkClick r:id="rId3"/>
+              </a:rPr>
+              <a:t>http</a:t>
+            </a:r>
+            <a:r>
+              <a:rPr lang="en-GB" sz="1100" dirty="0">
+                <a:hlinkClick r:id="rId3"/>
+              </a:rPr>
+              <a:t>://</a:t>
+            </a:r>
+            <a:r>
+              <a:rPr lang="en-GB" sz="1100" dirty="0" smtClean="0">
+                <a:hlinkClick r:id="rId3"/>
+              </a:rPr>
+              <a:t>dx.doi.org/10.1371/journal.pcbi.1003285</a:t>
+            </a:r>
+            <a:r>
+              <a:rPr lang="en-GB" sz="1100" dirty="0" smtClean="0"/>
+              <a:t>. </a:t>
+            </a:r>
             <a:endParaRPr lang="en-GB" sz="1800" dirty="0"/>
           </a:p>
           <a:p>
@@ -10038,6 +10288,723 @@
     <p:bldLst>
       <p:bldP spid="3" grpId="0" uiExpand="1" build="p"/>
     </p:bldLst>
+  </p:timing>
+</p:sld>
+</file>
+
+<file path=ppt/slides/slide3.xml><?xml version="1.0" encoding="utf-8"?>
+<p:sld xmlns:a="http://schemas.openxmlformats.org/drawingml/2006/main" xmlns:r="http://schemas.openxmlformats.org/officeDocument/2006/relationships" xmlns:p="http://schemas.openxmlformats.org/presentationml/2006/main">
+  <p:cSld>
+    <p:spTree>
+      <p:nvGrpSpPr>
+        <p:cNvPr id="1" name=""/>
+        <p:cNvGrpSpPr/>
+        <p:nvPr/>
+      </p:nvGrpSpPr>
+      <p:grpSpPr>
+        <a:xfrm>
+          <a:off x="0" y="0"/>
+          <a:ext cx="0" cy="0"/>
+          <a:chOff x="0" y="0"/>
+          <a:chExt cx="0" cy="0"/>
+        </a:xfrm>
+      </p:grpSpPr>
+      <p:sp>
+        <p:nvSpPr>
+          <p:cNvPr id="2" name="Title 1"/>
+          <p:cNvSpPr>
+            <a:spLocks noGrp="1"/>
+          </p:cNvSpPr>
+          <p:nvPr>
+            <p:ph type="title"/>
+          </p:nvPr>
+        </p:nvSpPr>
+        <p:spPr/>
+        <p:txBody>
+          <a:bodyPr/>
+          <a:lstStyle/>
+          <a:p>
+            <a:r>
+              <a:rPr lang="en-GB" dirty="0" smtClean="0"/>
+              <a:t>Why bother?</a:t>
+            </a:r>
+            <a:endParaRPr lang="en-GB" dirty="0"/>
+          </a:p>
+        </p:txBody>
+      </p:sp>
+      <p:sp>
+        <p:nvSpPr>
+          <p:cNvPr id="3" name="Content Placeholder 2"/>
+          <p:cNvSpPr>
+            <a:spLocks noGrp="1"/>
+          </p:cNvSpPr>
+          <p:nvPr>
+            <p:ph idx="1"/>
+          </p:nvPr>
+        </p:nvSpPr>
+        <p:spPr/>
+        <p:txBody>
+          <a:bodyPr>
+            <a:normAutofit fontScale="92500" lnSpcReduction="20000"/>
+          </a:bodyPr>
+          <a:lstStyle/>
+          <a:p>
+            <a:r>
+              <a:rPr lang="en-GB" dirty="0"/>
+              <a:t>P</a:t>
+            </a:r>
+            <a:r>
+              <a:rPr lang="en-GB" dirty="0" smtClean="0"/>
+              <a:t>oor </a:t>
+            </a:r>
+            <a:r>
+              <a:rPr lang="en-GB" dirty="0"/>
+              <a:t>organizational </a:t>
+            </a:r>
+            <a:r>
+              <a:rPr lang="en-GB"/>
+              <a:t>choices </a:t>
+            </a:r>
+            <a:r>
+              <a:rPr lang="en-GB" smtClean="0"/>
+              <a:t>can lead </a:t>
+            </a:r>
+            <a:r>
+              <a:rPr lang="en-GB" dirty="0"/>
+              <a:t>to significantly slower </a:t>
+            </a:r>
+            <a:r>
+              <a:rPr lang="en-GB"/>
+              <a:t>research </a:t>
+            </a:r>
+            <a:r>
+              <a:rPr lang="en-GB" smtClean="0"/>
+              <a:t>progress</a:t>
+            </a:r>
+            <a:endParaRPr lang="en-GB" dirty="0" smtClean="0"/>
+          </a:p>
+          <a:p>
+            <a:r>
+              <a:rPr lang="en-GB" dirty="0" smtClean="0"/>
+              <a:t>Help someone </a:t>
+            </a:r>
+            <a:r>
+              <a:rPr lang="en-GB" dirty="0"/>
+              <a:t>unfamiliar with your project </a:t>
+            </a:r>
+            <a:r>
+              <a:rPr lang="en-GB" dirty="0" smtClean="0"/>
+              <a:t>look </a:t>
+            </a:r>
+            <a:r>
+              <a:rPr lang="en-GB" dirty="0"/>
+              <a:t>at your </a:t>
+            </a:r>
+            <a:r>
+              <a:rPr lang="en-GB" dirty="0" smtClean="0"/>
+              <a:t>files </a:t>
+            </a:r>
+            <a:r>
+              <a:rPr lang="en-GB" dirty="0"/>
+              <a:t>and understand in detail what you did and </a:t>
+            </a:r>
+            <a:r>
+              <a:rPr lang="en-GB" dirty="0" smtClean="0"/>
+              <a:t>why</a:t>
+            </a:r>
+          </a:p>
+          <a:p>
+            <a:pPr lvl="1"/>
+            <a:r>
+              <a:rPr lang="en-GB" dirty="0" smtClean="0"/>
+              <a:t>Researchers, collaborators, students, research supervisors, PIs</a:t>
+            </a:r>
+          </a:p>
+          <a:p>
+            <a:pPr lvl="1"/>
+            <a:r>
+              <a:rPr lang="en-GB" dirty="0" smtClean="0"/>
+              <a:t>You!</a:t>
+            </a:r>
+          </a:p>
+          <a:p>
+            <a:r>
+              <a:rPr lang="en-GB" dirty="0" smtClean="0"/>
+              <a:t>Help </a:t>
+            </a:r>
+            <a:r>
+              <a:rPr lang="en-GB" dirty="0"/>
+              <a:t>yourself do things over and over </a:t>
+            </a:r>
+            <a:r>
+              <a:rPr lang="en-GB" dirty="0" smtClean="0"/>
+              <a:t>again</a:t>
+            </a:r>
+            <a:endParaRPr lang="en-GB" dirty="0"/>
+          </a:p>
+          <a:p>
+            <a:pPr lvl="1"/>
+            <a:r>
+              <a:rPr lang="en-GB" dirty="0"/>
+              <a:t> </a:t>
+            </a:r>
+            <a:r>
+              <a:rPr lang="en-GB" dirty="0" smtClean="0"/>
+              <a:t>Correct </a:t>
+            </a:r>
+            <a:r>
+              <a:rPr lang="en-GB" dirty="0"/>
+              <a:t>flaws in the initial preparation of the data being </a:t>
+            </a:r>
+            <a:r>
+              <a:rPr lang="en-GB" dirty="0" smtClean="0"/>
+              <a:t>analysed</a:t>
+            </a:r>
+            <a:endParaRPr lang="en-GB" dirty="0"/>
+          </a:p>
+          <a:p>
+            <a:pPr lvl="1"/>
+            <a:r>
+              <a:rPr lang="en-GB" dirty="0"/>
+              <a:t> </a:t>
+            </a:r>
+            <a:r>
+              <a:rPr lang="en-GB" dirty="0" smtClean="0"/>
+              <a:t>Update </a:t>
+            </a:r>
+            <a:r>
+              <a:rPr lang="en-GB" dirty="0"/>
+              <a:t>when you get access to new data</a:t>
+            </a:r>
+          </a:p>
+          <a:p>
+            <a:pPr lvl="1"/>
+            <a:r>
+              <a:rPr lang="en-GB" dirty="0"/>
+              <a:t> </a:t>
+            </a:r>
+            <a:r>
+              <a:rPr lang="en-GB" dirty="0" smtClean="0"/>
+              <a:t>Broaden </a:t>
+            </a:r>
+            <a:r>
+              <a:rPr lang="en-GB" dirty="0"/>
+              <a:t>parameterizations of a particular </a:t>
+            </a:r>
+            <a:r>
+              <a:rPr lang="en-GB" dirty="0" smtClean="0"/>
+              <a:t>model</a:t>
+            </a:r>
+          </a:p>
+          <a:p>
+            <a:pPr marL="274320" lvl="1" indent="0">
+              <a:buNone/>
+            </a:pPr>
+            <a:endParaRPr lang="en-GB" dirty="0" smtClean="0"/>
+          </a:p>
+          <a:p>
+            <a:pPr marL="274320" lvl="1" indent="0">
+              <a:buNone/>
+            </a:pPr>
+            <a:endParaRPr lang="en-GB" dirty="0" smtClean="0"/>
+          </a:p>
+          <a:p>
+            <a:pPr marL="0" indent="0">
+              <a:buNone/>
+            </a:pPr>
+            <a:r>
+              <a:rPr lang="en-GB" sz="1300" dirty="0" smtClean="0"/>
+              <a:t>Noble </a:t>
+            </a:r>
+            <a:r>
+              <a:rPr lang="en-GB" sz="1300" dirty="0"/>
+              <a:t>WS (2009) A Quick Guide to Organizing Computational Biology Projects. </a:t>
+            </a:r>
+            <a:r>
+              <a:rPr lang="en-GB" sz="1300" dirty="0" err="1"/>
+              <a:t>PLoS</a:t>
+            </a:r>
+            <a:r>
+              <a:rPr lang="en-GB" sz="1300" dirty="0"/>
+              <a:t> </a:t>
+            </a:r>
+            <a:r>
+              <a:rPr lang="en-GB" sz="1300" dirty="0" err="1"/>
+              <a:t>Comput</a:t>
+            </a:r>
+            <a:r>
+              <a:rPr lang="en-GB" sz="1300" dirty="0"/>
+              <a:t> </a:t>
+            </a:r>
+            <a:r>
+              <a:rPr lang="en-GB" sz="1300" dirty="0" err="1"/>
+              <a:t>Biol</a:t>
+            </a:r>
+            <a:r>
+              <a:rPr lang="en-GB" sz="1300" dirty="0"/>
+              <a:t> 5(7): e1000424. doi:10.1371/journal.pcbi.1000424. </a:t>
+            </a:r>
+            <a:r>
+              <a:rPr lang="en-GB" sz="1300" dirty="0">
+                <a:hlinkClick r:id="rId3"/>
+              </a:rPr>
+              <a:t>http://dx.doi.org/10.1371/journal.pcbi.1000424</a:t>
+            </a:r>
+            <a:r>
+              <a:rPr lang="en-GB" sz="1300" dirty="0" smtClean="0"/>
+              <a:t>.</a:t>
+            </a:r>
+            <a:r>
+              <a:rPr lang="en-GB" sz="1300" dirty="0"/>
+              <a:t> </a:t>
+            </a:r>
+            <a:endParaRPr lang="en-GB" dirty="0"/>
+          </a:p>
+          <a:p>
+            <a:endParaRPr lang="en-GB" dirty="0" smtClean="0"/>
+          </a:p>
+          <a:p>
+            <a:endParaRPr lang="en-GB" dirty="0" smtClean="0"/>
+          </a:p>
+          <a:p>
+            <a:endParaRPr lang="en-GB" dirty="0"/>
+          </a:p>
+          <a:p>
+            <a:endParaRPr lang="en-GB" dirty="0"/>
+          </a:p>
+        </p:txBody>
+      </p:sp>
+    </p:spTree>
+    <p:extLst>
+      <p:ext uri="{BB962C8B-B14F-4D97-AF65-F5344CB8AC3E}">
+        <p14:creationId xmlns:p14="http://schemas.microsoft.com/office/powerpoint/2010/main" val="3739764668"/>
+      </p:ext>
+    </p:extLst>
+  </p:cSld>
+  <p:clrMapOvr>
+    <a:masterClrMapping/>
+  </p:clrMapOvr>
+  <p:timing>
+    <p:tnLst>
+      <p:par>
+        <p:cTn id="1" dur="indefinite" restart="never" nodeType="tmRoot">
+          <p:childTnLst>
+            <p:seq concurrent="1" nextAc="seek">
+              <p:cTn id="2" dur="indefinite" nodeType="mainSeq">
+                <p:childTnLst>
+                  <p:par>
+                    <p:cTn id="3" fill="hold">
+                      <p:stCondLst>
+                        <p:cond delay="indefinite"/>
+                      </p:stCondLst>
+                      <p:childTnLst>
+                        <p:par>
+                          <p:cTn id="4" fill="hold">
+                            <p:stCondLst>
+                              <p:cond delay="0"/>
+                            </p:stCondLst>
+                            <p:childTnLst>
+                              <p:par>
+                                <p:cTn id="5" presetID="1" presetClass="entr" presetSubtype="0" fill="hold" nodeType="clickEffect">
+                                  <p:stCondLst>
+                                    <p:cond delay="0"/>
+                                  </p:stCondLst>
+                                  <p:childTnLst>
+                                    <p:set>
+                                      <p:cBhvr>
+                                        <p:cTn id="6" dur="1" fill="hold">
+                                          <p:stCondLst>
+                                            <p:cond delay="0"/>
+                                          </p:stCondLst>
+                                        </p:cTn>
+                                        <p:tgtEl>
+                                          <p:spTgt spid="3">
+                                            <p:txEl>
+                                              <p:pRg st="0" end="0"/>
+                                            </p:txEl>
+                                          </p:spTgt>
+                                        </p:tgtEl>
+                                        <p:attrNameLst>
+                                          <p:attrName>style.visibility</p:attrName>
+                                        </p:attrNameLst>
+                                      </p:cBhvr>
+                                      <p:to>
+                                        <p:strVal val="visible"/>
+                                      </p:to>
+                                    </p:set>
+                                  </p:childTnLst>
+                                </p:cTn>
+                              </p:par>
+                            </p:childTnLst>
+                          </p:cTn>
+                        </p:par>
+                      </p:childTnLst>
+                    </p:cTn>
+                  </p:par>
+                  <p:par>
+                    <p:cTn id="7" fill="hold">
+                      <p:stCondLst>
+                        <p:cond delay="indefinite"/>
+                      </p:stCondLst>
+                      <p:childTnLst>
+                        <p:par>
+                          <p:cTn id="8" fill="hold">
+                            <p:stCondLst>
+                              <p:cond delay="0"/>
+                            </p:stCondLst>
+                            <p:childTnLst>
+                              <p:par>
+                                <p:cTn id="9" presetID="1" presetClass="entr" presetSubtype="0" fill="hold" nodeType="clickEffect">
+                                  <p:stCondLst>
+                                    <p:cond delay="0"/>
+                                  </p:stCondLst>
+                                  <p:childTnLst>
+                                    <p:set>
+                                      <p:cBhvr>
+                                        <p:cTn id="10" dur="1" fill="hold">
+                                          <p:stCondLst>
+                                            <p:cond delay="0"/>
+                                          </p:stCondLst>
+                                        </p:cTn>
+                                        <p:tgtEl>
+                                          <p:spTgt spid="3">
+                                            <p:txEl>
+                                              <p:pRg st="1" end="1"/>
+                                            </p:txEl>
+                                          </p:spTgt>
+                                        </p:tgtEl>
+                                        <p:attrNameLst>
+                                          <p:attrName>style.visibility</p:attrName>
+                                        </p:attrNameLst>
+                                      </p:cBhvr>
+                                      <p:to>
+                                        <p:strVal val="visible"/>
+                                      </p:to>
+                                    </p:set>
+                                  </p:childTnLst>
+                                </p:cTn>
+                              </p:par>
+                            </p:childTnLst>
+                          </p:cTn>
+                        </p:par>
+                      </p:childTnLst>
+                    </p:cTn>
+                  </p:par>
+                  <p:par>
+                    <p:cTn id="11" fill="hold">
+                      <p:stCondLst>
+                        <p:cond delay="indefinite"/>
+                      </p:stCondLst>
+                      <p:childTnLst>
+                        <p:par>
+                          <p:cTn id="12" fill="hold">
+                            <p:stCondLst>
+                              <p:cond delay="0"/>
+                            </p:stCondLst>
+                            <p:childTnLst>
+                              <p:par>
+                                <p:cTn id="13" presetID="1" presetClass="entr" presetSubtype="0" fill="hold" nodeType="clickEffect">
+                                  <p:stCondLst>
+                                    <p:cond delay="0"/>
+                                  </p:stCondLst>
+                                  <p:childTnLst>
+                                    <p:set>
+                                      <p:cBhvr>
+                                        <p:cTn id="14" dur="1" fill="hold">
+                                          <p:stCondLst>
+                                            <p:cond delay="0"/>
+                                          </p:stCondLst>
+                                        </p:cTn>
+                                        <p:tgtEl>
+                                          <p:spTgt spid="3">
+                                            <p:txEl>
+                                              <p:pRg st="2" end="2"/>
+                                            </p:txEl>
+                                          </p:spTgt>
+                                        </p:tgtEl>
+                                        <p:attrNameLst>
+                                          <p:attrName>style.visibility</p:attrName>
+                                        </p:attrNameLst>
+                                      </p:cBhvr>
+                                      <p:to>
+                                        <p:strVal val="visible"/>
+                                      </p:to>
+                                    </p:set>
+                                  </p:childTnLst>
+                                </p:cTn>
+                              </p:par>
+                            </p:childTnLst>
+                          </p:cTn>
+                        </p:par>
+                      </p:childTnLst>
+                    </p:cTn>
+                  </p:par>
+                  <p:par>
+                    <p:cTn id="15" fill="hold">
+                      <p:stCondLst>
+                        <p:cond delay="indefinite"/>
+                      </p:stCondLst>
+                      <p:childTnLst>
+                        <p:par>
+                          <p:cTn id="16" fill="hold">
+                            <p:stCondLst>
+                              <p:cond delay="0"/>
+                            </p:stCondLst>
+                            <p:childTnLst>
+                              <p:par>
+                                <p:cTn id="17" presetID="1" presetClass="entr" presetSubtype="0" fill="hold" nodeType="clickEffect">
+                                  <p:stCondLst>
+                                    <p:cond delay="0"/>
+                                  </p:stCondLst>
+                                  <p:childTnLst>
+                                    <p:set>
+                                      <p:cBhvr>
+                                        <p:cTn id="18" dur="1" fill="hold">
+                                          <p:stCondLst>
+                                            <p:cond delay="0"/>
+                                          </p:stCondLst>
+                                        </p:cTn>
+                                        <p:tgtEl>
+                                          <p:spTgt spid="3">
+                                            <p:txEl>
+                                              <p:pRg st="3" end="3"/>
+                                            </p:txEl>
+                                          </p:spTgt>
+                                        </p:tgtEl>
+                                        <p:attrNameLst>
+                                          <p:attrName>style.visibility</p:attrName>
+                                        </p:attrNameLst>
+                                      </p:cBhvr>
+                                      <p:to>
+                                        <p:strVal val="visible"/>
+                                      </p:to>
+                                    </p:set>
+                                  </p:childTnLst>
+                                </p:cTn>
+                              </p:par>
+                            </p:childTnLst>
+                          </p:cTn>
+                        </p:par>
+                      </p:childTnLst>
+                    </p:cTn>
+                  </p:par>
+                  <p:par>
+                    <p:cTn id="19" fill="hold">
+                      <p:stCondLst>
+                        <p:cond delay="indefinite"/>
+                      </p:stCondLst>
+                      <p:childTnLst>
+                        <p:par>
+                          <p:cTn id="20" fill="hold">
+                            <p:stCondLst>
+                              <p:cond delay="0"/>
+                            </p:stCondLst>
+                            <p:childTnLst>
+                              <p:par>
+                                <p:cTn id="21" presetID="1" presetClass="entr" presetSubtype="0" fill="hold" nodeType="clickEffect">
+                                  <p:stCondLst>
+                                    <p:cond delay="0"/>
+                                  </p:stCondLst>
+                                  <p:childTnLst>
+                                    <p:set>
+                                      <p:cBhvr>
+                                        <p:cTn id="22" dur="1" fill="hold">
+                                          <p:stCondLst>
+                                            <p:cond delay="0"/>
+                                          </p:stCondLst>
+                                        </p:cTn>
+                                        <p:tgtEl>
+                                          <p:spTgt spid="3">
+                                            <p:txEl>
+                                              <p:pRg st="4" end="4"/>
+                                            </p:txEl>
+                                          </p:spTgt>
+                                        </p:tgtEl>
+                                        <p:attrNameLst>
+                                          <p:attrName>style.visibility</p:attrName>
+                                        </p:attrNameLst>
+                                      </p:cBhvr>
+                                      <p:to>
+                                        <p:strVal val="visible"/>
+                                      </p:to>
+                                    </p:set>
+                                  </p:childTnLst>
+                                </p:cTn>
+                              </p:par>
+                            </p:childTnLst>
+                          </p:cTn>
+                        </p:par>
+                      </p:childTnLst>
+                    </p:cTn>
+                  </p:par>
+                  <p:par>
+                    <p:cTn id="23" fill="hold">
+                      <p:stCondLst>
+                        <p:cond delay="indefinite"/>
+                      </p:stCondLst>
+                      <p:childTnLst>
+                        <p:par>
+                          <p:cTn id="24" fill="hold">
+                            <p:stCondLst>
+                              <p:cond delay="0"/>
+                            </p:stCondLst>
+                            <p:childTnLst>
+                              <p:par>
+                                <p:cTn id="25" presetID="1" presetClass="entr" presetSubtype="0" fill="hold" nodeType="clickEffect">
+                                  <p:stCondLst>
+                                    <p:cond delay="0"/>
+                                  </p:stCondLst>
+                                  <p:childTnLst>
+                                    <p:set>
+                                      <p:cBhvr>
+                                        <p:cTn id="26" dur="1" fill="hold">
+                                          <p:stCondLst>
+                                            <p:cond delay="0"/>
+                                          </p:stCondLst>
+                                        </p:cTn>
+                                        <p:tgtEl>
+                                          <p:spTgt spid="3">
+                                            <p:txEl>
+                                              <p:pRg st="5" end="5"/>
+                                            </p:txEl>
+                                          </p:spTgt>
+                                        </p:tgtEl>
+                                        <p:attrNameLst>
+                                          <p:attrName>style.visibility</p:attrName>
+                                        </p:attrNameLst>
+                                      </p:cBhvr>
+                                      <p:to>
+                                        <p:strVal val="visible"/>
+                                      </p:to>
+                                    </p:set>
+                                  </p:childTnLst>
+                                </p:cTn>
+                              </p:par>
+                            </p:childTnLst>
+                          </p:cTn>
+                        </p:par>
+                      </p:childTnLst>
+                    </p:cTn>
+                  </p:par>
+                  <p:par>
+                    <p:cTn id="27" fill="hold">
+                      <p:stCondLst>
+                        <p:cond delay="indefinite"/>
+                      </p:stCondLst>
+                      <p:childTnLst>
+                        <p:par>
+                          <p:cTn id="28" fill="hold">
+                            <p:stCondLst>
+                              <p:cond delay="0"/>
+                            </p:stCondLst>
+                            <p:childTnLst>
+                              <p:par>
+                                <p:cTn id="29" presetID="1" presetClass="entr" presetSubtype="0" fill="hold" nodeType="clickEffect">
+                                  <p:stCondLst>
+                                    <p:cond delay="0"/>
+                                  </p:stCondLst>
+                                  <p:childTnLst>
+                                    <p:set>
+                                      <p:cBhvr>
+                                        <p:cTn id="30" dur="1" fill="hold">
+                                          <p:stCondLst>
+                                            <p:cond delay="0"/>
+                                          </p:stCondLst>
+                                        </p:cTn>
+                                        <p:tgtEl>
+                                          <p:spTgt spid="3">
+                                            <p:txEl>
+                                              <p:pRg st="6" end="6"/>
+                                            </p:txEl>
+                                          </p:spTgt>
+                                        </p:tgtEl>
+                                        <p:attrNameLst>
+                                          <p:attrName>style.visibility</p:attrName>
+                                        </p:attrNameLst>
+                                      </p:cBhvr>
+                                      <p:to>
+                                        <p:strVal val="visible"/>
+                                      </p:to>
+                                    </p:set>
+                                  </p:childTnLst>
+                                </p:cTn>
+                              </p:par>
+                            </p:childTnLst>
+                          </p:cTn>
+                        </p:par>
+                      </p:childTnLst>
+                    </p:cTn>
+                  </p:par>
+                  <p:par>
+                    <p:cTn id="31" fill="hold">
+                      <p:stCondLst>
+                        <p:cond delay="indefinite"/>
+                      </p:stCondLst>
+                      <p:childTnLst>
+                        <p:par>
+                          <p:cTn id="32" fill="hold">
+                            <p:stCondLst>
+                              <p:cond delay="0"/>
+                            </p:stCondLst>
+                            <p:childTnLst>
+                              <p:par>
+                                <p:cTn id="33" presetID="1" presetClass="entr" presetSubtype="0" fill="hold" nodeType="clickEffect">
+                                  <p:stCondLst>
+                                    <p:cond delay="0"/>
+                                  </p:stCondLst>
+                                  <p:childTnLst>
+                                    <p:set>
+                                      <p:cBhvr>
+                                        <p:cTn id="34" dur="1" fill="hold">
+                                          <p:stCondLst>
+                                            <p:cond delay="0"/>
+                                          </p:stCondLst>
+                                        </p:cTn>
+                                        <p:tgtEl>
+                                          <p:spTgt spid="3">
+                                            <p:txEl>
+                                              <p:pRg st="7" end="7"/>
+                                            </p:txEl>
+                                          </p:spTgt>
+                                        </p:tgtEl>
+                                        <p:attrNameLst>
+                                          <p:attrName>style.visibility</p:attrName>
+                                        </p:attrNameLst>
+                                      </p:cBhvr>
+                                      <p:to>
+                                        <p:strVal val="visible"/>
+                                      </p:to>
+                                    </p:set>
+                                  </p:childTnLst>
+                                </p:cTn>
+                              </p:par>
+                            </p:childTnLst>
+                          </p:cTn>
+                        </p:par>
+                      </p:childTnLst>
+                    </p:cTn>
+                  </p:par>
+                </p:childTnLst>
+              </p:cTn>
+              <p:prevCondLst>
+                <p:cond evt="onPrev" delay="0">
+                  <p:tgtEl>
+                    <p:sldTgt/>
+                  </p:tgtEl>
+                </p:cond>
+              </p:prevCondLst>
+              <p:nextCondLst>
+                <p:cond evt="onNext" delay="0">
+                  <p:tgtEl>
+                    <p:sldTgt/>
+                  </p:tgtEl>
+                </p:cond>
+              </p:nextCondLst>
+            </p:seq>
+          </p:childTnLst>
+        </p:cTn>
+      </p:par>
+    </p:tnLst>
   </p:timing>
 </p:sld>
 </file>

</xml_diff>